<commit_message>
File Handling Lab and Exercises
</commit_message>
<xml_diff>
--- a/3-Python-Advanced/Course-Materials/03-Multidimensional-Lists.pptx
+++ b/3-Python-Advanced/Course-Materials/03-Multidimensional-Lists.pptx
@@ -5,10 +5,10 @@
     <p:sldMasterId id="2147483690" r:id="rId4"/>
   </p:sldMasterIdLst>
   <p:notesMasterIdLst>
-    <p:notesMasterId r:id="rId36"/>
+    <p:notesMasterId r:id="rId37"/>
   </p:notesMasterIdLst>
   <p:handoutMasterIdLst>
-    <p:handoutMasterId r:id="rId37"/>
+    <p:handoutMasterId r:id="rId38"/>
   </p:handoutMasterIdLst>
   <p:sldIdLst>
     <p:sldId id="256" r:id="rId5"/>
@@ -42,6 +42,7 @@
     <p:sldId id="401" r:id="rId33"/>
     <p:sldId id="405" r:id="rId34"/>
     <p:sldId id="493" r:id="rId35"/>
+    <p:sldId id="498" r:id="rId36"/>
   </p:sldIdLst>
   <p:sldSz cx="12192000" cy="6858000"/>
   <p:notesSz cx="6858000" cy="9144000"/>
@@ -200,6 +201,7 @@
             <p14:sldId id="401"/>
             <p14:sldId id="405"/>
             <p14:sldId id="493"/>
+            <p14:sldId id="498"/>
           </p14:sldIdLst>
         </p14:section>
       </p14:sectionLst>
@@ -319,7 +321,7 @@
           <a:p>
             <a:fld id="{4E087215-0C8F-4762-A664-737A353EC9A4}" type="datetimeFigureOut">
               <a:rPr lang="bg-BG" smtClean="0"/>
-              <a:t>12.5.2021 г.</a:t>
+              <a:t>12.6.2021 г.</a:t>
             </a:fld>
             <a:endParaRPr lang="bg-BG"/>
           </a:p>
@@ -510,7 +512,7 @@
           <a:p>
             <a:fld id="{72D84649-876A-46C9-8472-14CB09C070D8}" type="datetimeFigureOut">
               <a:rPr lang="en-US" smtClean="0"/>
-              <a:t>5/12/2021</a:t>
+              <a:t>6/12/2021</a:t>
             </a:fld>
             <a:endParaRPr lang="en-US"/>
           </a:p>
@@ -3677,7 +3679,7 @@
                 <a:hlinkClick r:id="rId2">
                   <a:extLst>
                     <a:ext uri="{A12FA001-AC4F-418D-AE19-62706E023703}">
-                      <ahyp:hlinkClr xmlns:ahyp="http://schemas.microsoft.com/office/drawing/2018/hyperlinkcolor" val="tx"/>
+                      <ahyp:hlinkClr xmlns:ahyp="http://schemas.microsoft.com/office/drawing/2018/hyperlinkcolor" xmlns="" val="tx"/>
                     </a:ext>
                   </a:extLst>
                 </a:hlinkClick>
@@ -4635,7 +4637,7 @@
                 <a:hlinkClick r:id="rId12">
                   <a:extLst>
                     <a:ext uri="{A12FA001-AC4F-418D-AE19-62706E023703}">
-                      <ahyp:hlinkClr xmlns:ahyp="http://schemas.microsoft.com/office/drawing/2018/hyperlinkcolor" val="tx"/>
+                      <ahyp:hlinkClr xmlns:ahyp="http://schemas.microsoft.com/office/drawing/2018/hyperlinkcolor" xmlns="" val="tx"/>
                     </a:ext>
                   </a:extLst>
                 </a:hlinkClick>
@@ -23180,6 +23182,10 @@
             <a:endParaRPr lang="en-US" sz="3600" dirty="0"/>
           </a:p>
           <a:p>
+            <a:r>
+              <a:rPr lang="en-US" sz="3600" dirty="0"/>
+              <a:t/>
+            </a:r>
             <a:br>
               <a:rPr lang="en-US" sz="3600" dirty="0"/>
             </a:br>
@@ -23966,6 +23972,10 @@
             <a:endParaRPr lang="en-US" sz="3600" dirty="0"/>
           </a:p>
           <a:p>
+            <a:r>
+              <a:rPr lang="en-US" sz="3600" dirty="0"/>
+              <a:t/>
+            </a:r>
             <a:br>
               <a:rPr lang="en-US" sz="3600" dirty="0"/>
             </a:br>
@@ -26215,7 +26225,7 @@
         </p:spPr>
         <p:txBody>
           <a:bodyPr>
-            <a:normAutofit/>
+            <a:normAutofit lnSpcReduction="10000"/>
           </a:bodyPr>
           <a:lstStyle/>
           <a:p>
@@ -26726,6 +26736,148 @@
     <p:extLst>
       <p:ext uri="{BB962C8B-B14F-4D97-AF65-F5344CB8AC3E}">
         <p14:creationId xmlns:p14="http://schemas.microsoft.com/office/powerpoint/2010/main" val="2191741432"/>
+      </p:ext>
+    </p:extLst>
+  </p:cSld>
+  <p:clrMapOvr>
+    <a:masterClrMapping/>
+  </p:clrMapOvr>
+  <mc:AlternateContent xmlns:mc="http://schemas.openxmlformats.org/markup-compatibility/2006" xmlns:p14="http://schemas.microsoft.com/office/powerpoint/2010/main">
+    <mc:Choice Requires="p14">
+      <p:transition spd="slow" p14:dur="2000" advClick="0" advTm="5000"/>
+    </mc:Choice>
+    <mc:Fallback xmlns="">
+      <p:transition spd="slow" advClick="0" advTm="5000"/>
+    </mc:Fallback>
+  </mc:AlternateContent>
+</p:sld>
+</file>
+
+<file path=ppt/slides/slide32.xml><?xml version="1.0" encoding="utf-8"?>
+<p:sld xmlns:a="http://schemas.openxmlformats.org/drawingml/2006/main" xmlns:r="http://schemas.openxmlformats.org/officeDocument/2006/relationships" xmlns:p="http://schemas.openxmlformats.org/presentationml/2006/main">
+  <p:cSld>
+    <p:spTree>
+      <p:nvGrpSpPr>
+        <p:cNvPr id="1" name=""/>
+        <p:cNvGrpSpPr/>
+        <p:nvPr/>
+      </p:nvGrpSpPr>
+      <p:grpSpPr>
+        <a:xfrm>
+          <a:off x="0" y="0"/>
+          <a:ext cx="0" cy="0"/>
+          <a:chOff x="0" y="0"/>
+          <a:chExt cx="0" cy="0"/>
+        </a:xfrm>
+      </p:grpSpPr>
+      <p:sp>
+        <p:nvSpPr>
+          <p:cNvPr id="2" name="Slide Number Placeholder 1"/>
+          <p:cNvSpPr>
+            <a:spLocks noGrp="1"/>
+          </p:cNvSpPr>
+          <p:nvPr>
+            <p:ph type="sldNum" sz="quarter" idx="5"/>
+          </p:nvPr>
+        </p:nvSpPr>
+        <p:spPr/>
+        <p:txBody>
+          <a:bodyPr/>
+          <a:lstStyle/>
+          <a:p>
+            <a:fld id="{2BF067CD-8E6B-4360-9AA8-C5DF2A48A6D1}" type="slidenum">
+              <a:rPr lang="en-US" noProof="0" smtClean="0"/>
+              <a:pPr/>
+              <a:t>32</a:t>
+            </a:fld>
+            <a:endParaRPr lang="en-US" noProof="0"/>
+          </a:p>
+        </p:txBody>
+      </p:sp>
+      <p:sp>
+        <p:nvSpPr>
+          <p:cNvPr id="3" name="Text Placeholder 2"/>
+          <p:cNvSpPr>
+            <a:spLocks noGrp="1"/>
+          </p:cNvSpPr>
+          <p:nvPr>
+            <p:ph type="body" sz="quarter" idx="10"/>
+          </p:nvPr>
+        </p:nvSpPr>
+        <p:spPr/>
+        <p:txBody>
+          <a:bodyPr/>
+          <a:lstStyle/>
+          <a:p>
+            <a:r>
+              <a:rPr lang="en-GB" dirty="0" smtClean="0"/>
+              <a:t>Python Matrices and </a:t>
+            </a:r>
+            <a:r>
+              <a:rPr lang="en-GB" dirty="0" err="1" smtClean="0"/>
+              <a:t>NumPy</a:t>
+            </a:r>
+            <a:r>
+              <a:rPr lang="en-GB" dirty="0" smtClean="0"/>
+              <a:t> </a:t>
+            </a:r>
+            <a:r>
+              <a:rPr lang="en-GB" dirty="0" err="1" smtClean="0"/>
+              <a:t>Arra</a:t>
+            </a:r>
+            <a:endParaRPr lang="en-GB" dirty="0" smtClean="0"/>
+          </a:p>
+          <a:p>
+            <a:pPr marL="0" indent="0">
+              <a:buNone/>
+            </a:pPr>
+            <a:r>
+              <a:rPr lang="en-GB" dirty="0">
+                <a:hlinkClick r:id="rId2"/>
+              </a:rPr>
+              <a:t>https://</a:t>
+            </a:r>
+            <a:r>
+              <a:rPr lang="en-GB" dirty="0" smtClean="0">
+                <a:hlinkClick r:id="rId2"/>
+              </a:rPr>
+              <a:t>www.programiz.com/python-programming/matrix?fbclid=IwAR2wB0zR6vKn9TFl4-JcrnAS38XvSamd6AJEzNoS-gh_qWoySJn7Tgnnrlk</a:t>
+            </a:r>
+            <a:r>
+              <a:rPr lang="en-GB" dirty="0" smtClean="0"/>
+              <a:t> </a:t>
+            </a:r>
+            <a:endParaRPr lang="en-GB" dirty="0"/>
+          </a:p>
+        </p:txBody>
+      </p:sp>
+      <p:sp>
+        <p:nvSpPr>
+          <p:cNvPr id="4" name="Title 3"/>
+          <p:cNvSpPr>
+            <a:spLocks noGrp="1"/>
+          </p:cNvSpPr>
+          <p:nvPr>
+            <p:ph type="title"/>
+          </p:nvPr>
+        </p:nvSpPr>
+        <p:spPr/>
+        <p:txBody>
+          <a:bodyPr/>
+          <a:lstStyle/>
+          <a:p>
+            <a:r>
+              <a:rPr lang="en-GB" dirty="0" smtClean="0"/>
+              <a:t>Additional Lecturer Materials</a:t>
+            </a:r>
+            <a:endParaRPr lang="en-GB" dirty="0"/>
+          </a:p>
+        </p:txBody>
+      </p:sp>
+    </p:spTree>
+    <p:extLst>
+      <p:ext uri="{BB962C8B-B14F-4D97-AF65-F5344CB8AC3E}">
+        <p14:creationId xmlns:p14="http://schemas.microsoft.com/office/powerpoint/2010/main" val="2870416581"/>
       </p:ext>
     </p:extLst>
   </p:cSld>
@@ -27969,6 +28121,10 @@
             <a:pPr marL="0" indent="0">
               <a:buNone/>
             </a:pPr>
+            <a:r>
+              <a:rPr lang="en-US" dirty="0"/>
+              <a:t/>
+            </a:r>
             <a:br>
               <a:rPr lang="en-US" dirty="0"/>
             </a:br>
@@ -30715,12 +30871,6 @@
 </file>
 
 <file path=customXml/item1.xml><?xml version="1.0" encoding="utf-8"?>
-<p:properties xmlns:p="http://schemas.microsoft.com/office/2006/metadata/properties" xmlns:xsi="http://www.w3.org/2001/XMLSchema-instance" xmlns:pc="http://schemas.microsoft.com/office/infopath/2007/PartnerControls">
-  <documentManagement/>
-</p:properties>
-</file>
-
-<file path=customXml/item2.xml><?xml version="1.0" encoding="utf-8"?>
 <ct:contentTypeSchema xmlns:ct="http://schemas.microsoft.com/office/2006/metadata/contentType" xmlns:ma="http://schemas.microsoft.com/office/2006/metadata/properties/metaAttributes" ct:_="" ma:_="" ma:contentTypeName="Document" ma:contentTypeID="0x0101000D461FD2BAC48847BF71EA25093C87E2" ma:contentTypeVersion="2" ma:contentTypeDescription="Create a new document." ma:contentTypeScope="" ma:versionID="2de9411e898187ae4fbc1c307cff5cee">
   <xsd:schema xmlns:xsd="http://www.w3.org/2001/XMLSchema" xmlns:xs="http://www.w3.org/2001/XMLSchema" xmlns:p="http://schemas.microsoft.com/office/2006/metadata/properties" xmlns:ns2="b1da4528-fe13-414f-b133-a49aeaaa47fa" targetNamespace="http://schemas.microsoft.com/office/2006/metadata/properties" ma:root="true" ma:fieldsID="f62062ac03ec282dc182e15a36aa4377" ns2:_="">
     <xsd:import namespace="b1da4528-fe13-414f-b133-a49aeaaa47fa"/>
@@ -30852,6 +31002,12 @@
 </ct:contentTypeSchema>
 </file>
 
+<file path=customXml/item2.xml><?xml version="1.0" encoding="utf-8"?>
+<p:properties xmlns:p="http://schemas.microsoft.com/office/2006/metadata/properties" xmlns:xsi="http://www.w3.org/2001/XMLSchema-instance" xmlns:pc="http://schemas.microsoft.com/office/infopath/2007/PartnerControls">
+  <documentManagement/>
+</p:properties>
+</file>
+
 <file path=customXml/item3.xml><?xml version="1.0" encoding="utf-8"?>
 <?mso-contentType ?>
 <FormTemplates xmlns="http://schemas.microsoft.com/sharepoint/v3/contenttype/forms">
@@ -30862,22 +31018,6 @@
 </file>
 
 <file path=customXml/itemProps1.xml><?xml version="1.0" encoding="utf-8"?>
-<ds:datastoreItem xmlns:ds="http://schemas.openxmlformats.org/officeDocument/2006/customXml" ds:itemID="{620D820E-79FD-4E85-8B45-1A7863F24FD2}">
-  <ds:schemaRefs>
-    <ds:schemaRef ds:uri="http://purl.org/dc/terms/"/>
-    <ds:schemaRef ds:uri="http://schemas.openxmlformats.org/package/2006/metadata/core-properties"/>
-    <ds:schemaRef ds:uri="http://purl.org/dc/dcmitype/"/>
-    <ds:schemaRef ds:uri="http://schemas.microsoft.com/office/infopath/2007/PartnerControls"/>
-    <ds:schemaRef ds:uri="http://purl.org/dc/elements/1.1/"/>
-    <ds:schemaRef ds:uri="http://schemas.microsoft.com/office/2006/metadata/properties"/>
-    <ds:schemaRef ds:uri="http://schemas.microsoft.com/office/2006/documentManagement/types"/>
-    <ds:schemaRef ds:uri="b1da4528-fe13-414f-b133-a49aeaaa47fa"/>
-    <ds:schemaRef ds:uri="http://www.w3.org/XML/1998/namespace"/>
-  </ds:schemaRefs>
-</ds:datastoreItem>
-</file>
-
-<file path=customXml/itemProps2.xml><?xml version="1.0" encoding="utf-8"?>
 <ds:datastoreItem xmlns:ds="http://schemas.openxmlformats.org/officeDocument/2006/customXml" ds:itemID="{ED4789D0-F838-4642-BCA9-DA05D714CAC5}">
   <ds:schemaRefs>
     <ds:schemaRef ds:uri="http://schemas.microsoft.com/office/2006/metadata/contentType"/>
@@ -30895,6 +31035,22 @@
 </ds:datastoreItem>
 </file>
 
+<file path=customXml/itemProps2.xml><?xml version="1.0" encoding="utf-8"?>
+<ds:datastoreItem xmlns:ds="http://schemas.openxmlformats.org/officeDocument/2006/customXml" ds:itemID="{620D820E-79FD-4E85-8B45-1A7863F24FD2}">
+  <ds:schemaRefs>
+    <ds:schemaRef ds:uri="http://purl.org/dc/terms/"/>
+    <ds:schemaRef ds:uri="http://schemas.openxmlformats.org/package/2006/metadata/core-properties"/>
+    <ds:schemaRef ds:uri="http://purl.org/dc/dcmitype/"/>
+    <ds:schemaRef ds:uri="http://schemas.microsoft.com/office/infopath/2007/PartnerControls"/>
+    <ds:schemaRef ds:uri="http://purl.org/dc/elements/1.1/"/>
+    <ds:schemaRef ds:uri="http://schemas.microsoft.com/office/2006/metadata/properties"/>
+    <ds:schemaRef ds:uri="http://schemas.microsoft.com/office/2006/documentManagement/types"/>
+    <ds:schemaRef ds:uri="b1da4528-fe13-414f-b133-a49aeaaa47fa"/>
+    <ds:schemaRef ds:uri="http://www.w3.org/XML/1998/namespace"/>
+  </ds:schemaRefs>
+</ds:datastoreItem>
+</file>
+
 <file path=customXml/itemProps3.xml><?xml version="1.0" encoding="utf-8"?>
 <ds:datastoreItem xmlns:ds="http://schemas.openxmlformats.org/officeDocument/2006/customXml" ds:itemID="{B54C8BF6-F98D-4DB6-B174-7838483A269D}">
   <ds:schemaRefs>

</xml_diff>